<commit_message>
Reviewed Lecture 2 materials
</commit_message>
<xml_diff>
--- a/presentations/02_What_is_cloud.pptx
+++ b/presentations/02_What_is_cloud.pptx
@@ -394,7 +394,7 @@
           <a:p>
             <a:fld id="{C7D5C5CF-EC13-4922-9963-1003B612C353}" type="datetimeFigureOut">
               <a:rPr lang="en-US" smtClean="0"/>
-              <a:t>09-Jun-21</a:t>
+              <a:t>27-Jan-22</a:t>
             </a:fld>
             <a:endParaRPr lang="en-US"/>
           </a:p>
@@ -4373,7 +4373,7 @@
           <a:p>
             <a:fld id="{DED68B2C-3021-48BA-A5BE-74845F75E7EB}" type="datetimeFigureOut">
               <a:rPr lang="en-US" smtClean="0"/>
-              <a:t>09-Jun-21</a:t>
+              <a:t>27-Jan-22</a:t>
             </a:fld>
             <a:endParaRPr lang="en-US"/>
           </a:p>
@@ -4571,7 +4571,7 @@
           <a:p>
             <a:fld id="{DED68B2C-3021-48BA-A5BE-74845F75E7EB}" type="datetimeFigureOut">
               <a:rPr lang="en-US" smtClean="0"/>
-              <a:t>09-Jun-21</a:t>
+              <a:t>27-Jan-22</a:t>
             </a:fld>
             <a:endParaRPr lang="en-US"/>
           </a:p>
@@ -4779,7 +4779,7 @@
           <a:p>
             <a:fld id="{DED68B2C-3021-48BA-A5BE-74845F75E7EB}" type="datetimeFigureOut">
               <a:rPr lang="en-US" smtClean="0"/>
-              <a:t>09-Jun-21</a:t>
+              <a:t>27-Jan-22</a:t>
             </a:fld>
             <a:endParaRPr lang="en-US"/>
           </a:p>
@@ -4977,7 +4977,7 @@
           <a:p>
             <a:fld id="{DED68B2C-3021-48BA-A5BE-74845F75E7EB}" type="datetimeFigureOut">
               <a:rPr lang="en-US" smtClean="0"/>
-              <a:t>09-Jun-21</a:t>
+              <a:t>27-Jan-22</a:t>
             </a:fld>
             <a:endParaRPr lang="en-US"/>
           </a:p>
@@ -5252,7 +5252,7 @@
           <a:p>
             <a:fld id="{DED68B2C-3021-48BA-A5BE-74845F75E7EB}" type="datetimeFigureOut">
               <a:rPr lang="en-US" smtClean="0"/>
-              <a:t>09-Jun-21</a:t>
+              <a:t>27-Jan-22</a:t>
             </a:fld>
             <a:endParaRPr lang="en-US"/>
           </a:p>
@@ -5517,7 +5517,7 @@
           <a:p>
             <a:fld id="{DED68B2C-3021-48BA-A5BE-74845F75E7EB}" type="datetimeFigureOut">
               <a:rPr lang="en-US" smtClean="0"/>
-              <a:t>09-Jun-21</a:t>
+              <a:t>27-Jan-22</a:t>
             </a:fld>
             <a:endParaRPr lang="en-US"/>
           </a:p>
@@ -5929,7 +5929,7 @@
           <a:p>
             <a:fld id="{DED68B2C-3021-48BA-A5BE-74845F75E7EB}" type="datetimeFigureOut">
               <a:rPr lang="en-US" smtClean="0"/>
-              <a:t>09-Jun-21</a:t>
+              <a:t>27-Jan-22</a:t>
             </a:fld>
             <a:endParaRPr lang="en-US"/>
           </a:p>
@@ -6070,7 +6070,7 @@
           <a:p>
             <a:fld id="{DED68B2C-3021-48BA-A5BE-74845F75E7EB}" type="datetimeFigureOut">
               <a:rPr lang="en-US" smtClean="0"/>
-              <a:t>09-Jun-21</a:t>
+              <a:t>27-Jan-22</a:t>
             </a:fld>
             <a:endParaRPr lang="en-US"/>
           </a:p>
@@ -6183,7 +6183,7 @@
           <a:p>
             <a:fld id="{DED68B2C-3021-48BA-A5BE-74845F75E7EB}" type="datetimeFigureOut">
               <a:rPr lang="en-US" smtClean="0"/>
-              <a:t>09-Jun-21</a:t>
+              <a:t>27-Jan-22</a:t>
             </a:fld>
             <a:endParaRPr lang="en-US"/>
           </a:p>
@@ -6494,7 +6494,7 @@
           <a:p>
             <a:fld id="{DED68B2C-3021-48BA-A5BE-74845F75E7EB}" type="datetimeFigureOut">
               <a:rPr lang="en-US" smtClean="0"/>
-              <a:t>09-Jun-21</a:t>
+              <a:t>27-Jan-22</a:t>
             </a:fld>
             <a:endParaRPr lang="en-US"/>
           </a:p>
@@ -6782,7 +6782,7 @@
           <a:p>
             <a:fld id="{DED68B2C-3021-48BA-A5BE-74845F75E7EB}" type="datetimeFigureOut">
               <a:rPr lang="en-US" smtClean="0"/>
-              <a:t>09-Jun-21</a:t>
+              <a:t>27-Jan-22</a:t>
             </a:fld>
             <a:endParaRPr lang="en-US"/>
           </a:p>
@@ -7023,7 +7023,7 @@
           <a:p>
             <a:fld id="{DED68B2C-3021-48BA-A5BE-74845F75E7EB}" type="datetimeFigureOut">
               <a:rPr lang="en-US" smtClean="0"/>
-              <a:t>09-Jun-21</a:t>
+              <a:t>27-Jan-22</a:t>
             </a:fld>
             <a:endParaRPr lang="en-US"/>
           </a:p>
@@ -9493,7 +9493,7 @@
             </a:pPr>
             <a:r>
               <a:rPr lang="en-US" dirty="0"/>
-              <a:t>Learning session 1 (June 17-19)</a:t>
+              <a:t>Learning session 1</a:t>
             </a:r>
           </a:p>
           <a:p>
@@ -14038,7 +14038,7 @@
             </a:r>
             <a:r>
               <a:rPr lang="en-US" dirty="0"/>
-              <a:t> (likely will be replaced/hidden by </a:t>
+              <a:t> (is being replaced by </a:t>
             </a:r>
             <a:r>
               <a:rPr lang="en-US" dirty="0">
@@ -16082,64 +16082,41 @@
               <a:rPr lang="en-US" dirty="0">
                 <a:hlinkClick r:id="rId2"/>
               </a:rPr>
-              <a:t>Azure</a:t>
-            </a:r>
-            <a:r>
-              <a:rPr lang="en-US" dirty="0"/>
-              <a:t> and </a:t>
+              <a:t>single table</a:t>
+            </a:r>
+            <a:endParaRPr lang="en-US" dirty="0"/>
+          </a:p>
+          <a:p>
+            <a:r>
+              <a:rPr lang="en-US" dirty="0"/>
+              <a:t>Compare Azure to others: </a:t>
             </a:r>
             <a:r>
               <a:rPr lang="en-US" dirty="0">
                 <a:hlinkClick r:id="rId3"/>
               </a:rPr>
-              <a:t>AWS</a:t>
-            </a:r>
-            <a:r>
-              <a:rPr lang="en-US" dirty="0"/>
-              <a:t> (</a:t>
+              <a:t>GCP</a:t>
+            </a:r>
+            <a:r>
+              <a:rPr lang="en-US" dirty="0"/>
+              <a:t> and </a:t>
             </a:r>
             <a:r>
               <a:rPr lang="en-US" dirty="0">
                 <a:hlinkClick r:id="rId4"/>
               </a:rPr>
-              <a:t>single table</a:t>
-            </a:r>
-            <a:r>
-              <a:rPr lang="en-US" dirty="0"/>
-              <a:t>)</a:t>
-            </a:r>
-          </a:p>
-          <a:p>
-            <a:r>
-              <a:rPr lang="en-US" dirty="0"/>
-              <a:t>Compare Azure to others: </a:t>
+              <a:t>AWS</a:t>
+            </a:r>
+            <a:endParaRPr lang="en-US" dirty="0"/>
+          </a:p>
+          <a:p>
+            <a:r>
+              <a:rPr lang="en-US" dirty="0"/>
+              <a:t>+ IBM, Oracle, Alibaba at </a:t>
             </a:r>
             <a:r>
               <a:rPr lang="en-US" dirty="0">
                 <a:hlinkClick r:id="rId5"/>
-              </a:rPr>
-              <a:t>GCP</a:t>
-            </a:r>
-            <a:r>
-              <a:rPr lang="en-US" dirty="0"/>
-              <a:t> and </a:t>
-            </a:r>
-            <a:r>
-              <a:rPr lang="en-US" dirty="0">
-                <a:hlinkClick r:id="rId6"/>
-              </a:rPr>
-              <a:t>AWS</a:t>
-            </a:r>
-            <a:endParaRPr lang="en-US" dirty="0"/>
-          </a:p>
-          <a:p>
-            <a:r>
-              <a:rPr lang="en-US" dirty="0"/>
-              <a:t>+ IBM, Oracle, Alibaba at </a:t>
-            </a:r>
-            <a:r>
-              <a:rPr lang="en-US" dirty="0">
-                <a:hlinkClick r:id="rId7"/>
               </a:rPr>
               <a:t>Compare Clouds</a:t>
             </a:r>

</xml_diff>